<commit_message>
Kcse Data.csv,notebook and pptx presentation updated
</commit_message>
<xml_diff>
--- a/KCSE_DATA_ANALYSIS PRESENTATION.pptx
+++ b/KCSE_DATA_ANALYSIS PRESENTATION.pptx
@@ -2766,8 +2766,8 @@
         </p:nvSpPr>
         <p:spPr>
           <a:xfrm>
-            <a:off x="504000" y="225720"/>
-            <a:ext cx="9070920" cy="946080"/>
+            <a:off x="504000" y="226080"/>
+            <a:ext cx="9072000" cy="946440"/>
           </a:xfrm>
           <a:prstGeom prst="rect">
             <a:avLst/>
@@ -2804,7 +2804,7 @@
         <p:spPr>
           <a:xfrm>
             <a:off x="504000" y="1326600"/>
-            <a:ext cx="9070920" cy="3287520"/>
+            <a:ext cx="9072000" cy="3288600"/>
           </a:xfrm>
           <a:prstGeom prst="rect">
             <a:avLst/>
@@ -3277,7 +3277,7 @@
         <p:spPr>
           <a:xfrm>
             <a:off x="504000" y="810000"/>
-            <a:ext cx="9070920" cy="1295280"/>
+            <a:ext cx="9070560" cy="1294920"/>
           </a:xfrm>
           <a:prstGeom prst="rect">
             <a:avLst/>
@@ -3328,7 +3328,7 @@
         <p:spPr>
           <a:xfrm>
             <a:off x="529560" y="2046600"/>
-            <a:ext cx="9070920" cy="2753280"/>
+            <a:ext cx="9070560" cy="2752920"/>
           </a:xfrm>
           <a:prstGeom prst="rect">
             <a:avLst/>
@@ -3392,14 +3392,14 @@
       </p:sp>
       <p:sp>
         <p:nvSpPr>
-          <p:cNvPr id="78" name="TextShape 3"/>
-          <p:cNvSpPr txBox="1"/>
+          <p:cNvPr id="78" name="CustomShape 3"/>
+          <p:cNvSpPr/>
           <p:nvPr/>
         </p:nvSpPr>
         <p:spPr>
           <a:xfrm>
             <a:off x="914400" y="5162760"/>
-            <a:ext cx="5029200" cy="323640"/>
+            <a:ext cx="5028840" cy="323280"/>
           </a:xfrm>
           <a:prstGeom prst="rect">
             <a:avLst/>
@@ -3409,11 +3409,22 @@
             <a:noFill/>
           </a:ln>
         </p:spPr>
+        <p:style>
+          <a:lnRef idx="0"/>
+          <a:fillRef idx="0"/>
+          <a:effectRef idx="0"/>
+          <a:fontRef idx="minor"/>
+        </p:style>
         <p:txBody>
           <a:bodyPr lIns="90000" rIns="90000" tIns="45000" bIns="45000">
             <a:noAutofit/>
           </a:bodyPr>
           <a:p>
+            <a:pPr>
+              <a:lnSpc>
+                <a:spcPct val="100000"/>
+              </a:lnSpc>
+            </a:pPr>
             <a:r>
               <a:rPr b="0" lang="en-US" sz="1400" spc="-1" strike="noStrike">
                 <a:latin typeface="Bitstream Vera Sans"/>
@@ -3421,28 +3432,32 @@
               <a:t> </a:t>
             </a:r>
             <a:r>
-              <a:rPr b="0" lang="en-US" sz="1400" spc="-1" strike="noStrike">
+              <a:rPr b="0" lang="en-US" sz="1400" spc="-1" strike="noStrike" u="sng">
+                <a:solidFill>
+                  <a:srgbClr val="0000ff"/>
+                </a:solidFill>
+                <a:uFillTx/>
                 <a:latin typeface="Bitstream Vera Sans"/>
                 <a:hlinkClick r:id="rId1"/>
               </a:rPr>
               <a:t>https://github.com/MugoBrian/Kcse-Data-Analysis</a:t>
             </a:r>
             <a:endParaRPr b="0" lang="en-US" sz="1400" spc="-1" strike="noStrike">
-              <a:latin typeface="Bitstream Vera Sans"/>
-            </a:endParaRPr>
-          </a:p>
-        </p:txBody>
-      </p:sp>
-      <p:sp>
-        <p:nvSpPr>
-          <p:cNvPr id="79" name="TextShape 4"/>
-          <p:cNvSpPr txBox="1"/>
+              <a:latin typeface="Arial"/>
+            </a:endParaRPr>
+          </a:p>
+        </p:txBody>
+      </p:sp>
+      <p:sp>
+        <p:nvSpPr>
+          <p:cNvPr id="79" name="CustomShape 4"/>
+          <p:cNvSpPr/>
           <p:nvPr/>
         </p:nvSpPr>
         <p:spPr>
           <a:xfrm>
             <a:off x="914400" y="4705560"/>
-            <a:ext cx="2743200" cy="323640"/>
+            <a:ext cx="2742840" cy="323280"/>
           </a:xfrm>
           <a:prstGeom prst="rect">
             <a:avLst/>
@@ -3452,11 +3467,22 @@
             <a:noFill/>
           </a:ln>
         </p:spPr>
+        <p:style>
+          <a:lnRef idx="0"/>
+          <a:fillRef idx="0"/>
+          <a:effectRef idx="0"/>
+          <a:fontRef idx="minor"/>
+        </p:style>
         <p:txBody>
           <a:bodyPr lIns="90000" rIns="90000" tIns="45000" bIns="45000">
             <a:noAutofit/>
           </a:bodyPr>
           <a:p>
+            <a:pPr>
+              <a:lnSpc>
+                <a:spcPct val="100000"/>
+              </a:lnSpc>
+            </a:pPr>
             <a:r>
               <a:rPr b="0" lang="en-US" sz="1400" spc="-1" strike="noStrike">
                 <a:latin typeface="Bitstream Vera Sans"/>
@@ -3464,7 +3490,7 @@
               <a:t>NB: For the full report visit: </a:t>
             </a:r>
             <a:endParaRPr b="0" lang="en-US" sz="1400" spc="-1" strike="noStrike">
-              <a:latin typeface="Bitstream Vera Sans"/>
+              <a:latin typeface="Arial"/>
             </a:endParaRPr>
           </a:p>
         </p:txBody>
@@ -3508,7 +3534,7 @@
         <p:spPr>
           <a:xfrm>
             <a:off x="504000" y="225720"/>
-            <a:ext cx="9070920" cy="946080"/>
+            <a:ext cx="9070560" cy="945720"/>
           </a:xfrm>
           <a:prstGeom prst="rect">
             <a:avLst/>
@@ -3559,7 +3585,7 @@
         <p:spPr>
           <a:xfrm>
             <a:off x="504000" y="1326600"/>
-            <a:ext cx="9070920" cy="3287520"/>
+            <a:ext cx="9070560" cy="3287160"/>
           </a:xfrm>
           <a:prstGeom prst="rect">
             <a:avLst/>
@@ -3578,14 +3604,14 @@
       </p:sp>
       <p:sp>
         <p:nvSpPr>
-          <p:cNvPr id="82" name="TextShape 3"/>
-          <p:cNvSpPr txBox="1"/>
+          <p:cNvPr id="82" name="CustomShape 3"/>
+          <p:cNvSpPr/>
           <p:nvPr/>
         </p:nvSpPr>
         <p:spPr>
           <a:xfrm>
             <a:off x="457200" y="985680"/>
-            <a:ext cx="8686800" cy="532440"/>
+            <a:ext cx="8686440" cy="532080"/>
           </a:xfrm>
           <a:prstGeom prst="rect">
             <a:avLst/>
@@ -3595,11 +3621,22 @@
             <a:noFill/>
           </a:ln>
         </p:spPr>
+        <p:style>
+          <a:lnRef idx="0"/>
+          <a:fillRef idx="0"/>
+          <a:effectRef idx="0"/>
+          <a:fontRef idx="minor"/>
+        </p:style>
         <p:txBody>
           <a:bodyPr lIns="90000" rIns="90000" tIns="45000" bIns="45000">
             <a:noAutofit/>
           </a:bodyPr>
           <a:p>
+            <a:pPr>
+              <a:lnSpc>
+                <a:spcPct val="100000"/>
+              </a:lnSpc>
+            </a:pPr>
             <a:r>
               <a:rPr b="0" lang="en-US" sz="1500" spc="-1" strike="noStrike">
                 <a:latin typeface="Bitstream Vera Sans"/>
@@ -3607,21 +3644,21 @@
               <a:t>In my exploratory analysis, I used the hypothesis questions (formulated by Allan Gitau after our group discussion)</a:t>
             </a:r>
             <a:endParaRPr b="0" lang="en-US" sz="1500" spc="-1" strike="noStrike">
-              <a:latin typeface="Bitstream Vera Sans"/>
-            </a:endParaRPr>
-          </a:p>
-        </p:txBody>
-      </p:sp>
-      <p:sp>
-        <p:nvSpPr>
-          <p:cNvPr id="83" name="TextShape 4"/>
-          <p:cNvSpPr txBox="1"/>
+              <a:latin typeface="Arial"/>
+            </a:endParaRPr>
+          </a:p>
+        </p:txBody>
+      </p:sp>
+      <p:sp>
+        <p:nvSpPr>
+          <p:cNvPr id="83" name="CustomShape 4"/>
+          <p:cNvSpPr/>
           <p:nvPr/>
         </p:nvSpPr>
         <p:spPr>
           <a:xfrm>
             <a:off x="457200" y="1418040"/>
-            <a:ext cx="8458200" cy="3611160"/>
+            <a:ext cx="8457840" cy="3610800"/>
           </a:xfrm>
           <a:prstGeom prst="rect">
             <a:avLst/>
@@ -3631,16 +3668,32 @@
             <a:noFill/>
           </a:ln>
         </p:spPr>
+        <p:style>
+          <a:lnRef idx="0"/>
+          <a:fillRef idx="0"/>
+          <a:effectRef idx="0"/>
+          <a:fontRef idx="minor"/>
+        </p:style>
         <p:txBody>
           <a:bodyPr lIns="90000" rIns="90000" tIns="45000" bIns="45000">
             <a:noAutofit/>
           </a:bodyPr>
           <a:p>
-            <a:endParaRPr b="0" lang="en-US" sz="1600" spc="-1" strike="noStrike">
-              <a:latin typeface="Bitstream Vera Sans"/>
-            </a:endParaRPr>
-          </a:p>
-          <a:p>
+            <a:pPr>
+              <a:lnSpc>
+                <a:spcPct val="100000"/>
+              </a:lnSpc>
+            </a:pPr>
+            <a:endParaRPr b="0" lang="en-US" sz="1800" spc="-1" strike="noStrike">
+              <a:latin typeface="Arial"/>
+            </a:endParaRPr>
+          </a:p>
+          <a:p>
+            <a:pPr>
+              <a:lnSpc>
+                <a:spcPct val="100000"/>
+              </a:lnSpc>
+            </a:pPr>
             <a:r>
               <a:rPr b="0" lang="en-US" sz="1600" spc="-1" strike="noStrike">
                 <a:solidFill>
@@ -3652,15 +3705,25 @@
               <a:t>Has performance improved or declined?</a:t>
             </a:r>
             <a:endParaRPr b="0" lang="en-US" sz="1600" spc="-1" strike="noStrike">
-              <a:latin typeface="Bitstream Vera Sans"/>
-            </a:endParaRPr>
-          </a:p>
-          <a:p>
+              <a:latin typeface="Arial"/>
+            </a:endParaRPr>
+          </a:p>
+          <a:p>
+            <a:pPr>
+              <a:lnSpc>
+                <a:spcPct val="100000"/>
+              </a:lnSpc>
+            </a:pPr>
             <a:endParaRPr b="0" lang="en-US" sz="1600" spc="-1" strike="noStrike">
-              <a:latin typeface="Bitstream Vera Sans"/>
-            </a:endParaRPr>
-          </a:p>
-          <a:p>
+              <a:latin typeface="Arial"/>
+            </a:endParaRPr>
+          </a:p>
+          <a:p>
+            <a:pPr>
+              <a:lnSpc>
+                <a:spcPct val="100000"/>
+              </a:lnSpc>
+            </a:pPr>
             <a:r>
               <a:rPr b="0" lang="en-US" sz="1600" spc="-1" strike="noStrike">
                 <a:solidFill>
@@ -3672,15 +3735,25 @@
               <a:t>Has the number of candidates increased or decreasaed?</a:t>
             </a:r>
             <a:endParaRPr b="0" lang="en-US" sz="1600" spc="-1" strike="noStrike">
-              <a:latin typeface="Bitstream Vera Sans"/>
-            </a:endParaRPr>
-          </a:p>
-          <a:p>
+              <a:latin typeface="Arial"/>
+            </a:endParaRPr>
+          </a:p>
+          <a:p>
+            <a:pPr>
+              <a:lnSpc>
+                <a:spcPct val="100000"/>
+              </a:lnSpc>
+            </a:pPr>
             <a:endParaRPr b="0" lang="en-US" sz="1600" spc="-1" strike="noStrike">
-              <a:latin typeface="Bitstream Vera Sans"/>
-            </a:endParaRPr>
-          </a:p>
-          <a:p>
+              <a:latin typeface="Arial"/>
+            </a:endParaRPr>
+          </a:p>
+          <a:p>
+            <a:pPr>
+              <a:lnSpc>
+                <a:spcPct val="100000"/>
+              </a:lnSpc>
+            </a:pPr>
             <a:r>
               <a:rPr b="0" lang="en-US" sz="1600" spc="-1" strike="noStrike">
                 <a:solidFill>
@@ -3692,15 +3765,25 @@
               <a:t>What is the difference between male and female performance? </a:t>
             </a:r>
             <a:endParaRPr b="0" lang="en-US" sz="1600" spc="-1" strike="noStrike">
-              <a:latin typeface="Bitstream Vera Sans"/>
-            </a:endParaRPr>
-          </a:p>
-          <a:p>
+              <a:latin typeface="Arial"/>
+            </a:endParaRPr>
+          </a:p>
+          <a:p>
+            <a:pPr>
+              <a:lnSpc>
+                <a:spcPct val="100000"/>
+              </a:lnSpc>
+            </a:pPr>
             <a:endParaRPr b="0" lang="en-US" sz="1600" spc="-1" strike="noStrike">
-              <a:latin typeface="Bitstream Vera Sans"/>
-            </a:endParaRPr>
-          </a:p>
-          <a:p>
+              <a:latin typeface="Arial"/>
+            </a:endParaRPr>
+          </a:p>
+          <a:p>
+            <a:pPr>
+              <a:lnSpc>
+                <a:spcPct val="100000"/>
+              </a:lnSpc>
+            </a:pPr>
             <a:r>
               <a:rPr b="0" lang="en-US" sz="1600" spc="-1" strike="noStrike">
                 <a:solidFill>
@@ -3712,15 +3795,25 @@
               <a:t>Has the gap in gender difference increased or decreased?</a:t>
             </a:r>
             <a:endParaRPr b="0" lang="en-US" sz="1600" spc="-1" strike="noStrike">
-              <a:latin typeface="Bitstream Vera Sans"/>
-            </a:endParaRPr>
-          </a:p>
-          <a:p>
+              <a:latin typeface="Arial"/>
+            </a:endParaRPr>
+          </a:p>
+          <a:p>
+            <a:pPr>
+              <a:lnSpc>
+                <a:spcPct val="100000"/>
+              </a:lnSpc>
+            </a:pPr>
             <a:endParaRPr b="0" lang="en-US" sz="1600" spc="-1" strike="noStrike">
-              <a:latin typeface="Bitstream Vera Sans"/>
-            </a:endParaRPr>
-          </a:p>
-          <a:p>
+              <a:latin typeface="Arial"/>
+            </a:endParaRPr>
+          </a:p>
+          <a:p>
+            <a:pPr>
+              <a:lnSpc>
+                <a:spcPct val="100000"/>
+              </a:lnSpc>
+            </a:pPr>
             <a:r>
               <a:rPr b="0" lang="en-US" sz="1600" spc="-1" strike="noStrike">
                 <a:solidFill>
@@ -3732,15 +3825,25 @@
               <a:t>How do the quality grades (A – C+) compare to non-quality grades(C – E)?</a:t>
             </a:r>
             <a:endParaRPr b="0" lang="en-US" sz="1600" spc="-1" strike="noStrike">
-              <a:latin typeface="Bitstream Vera Sans"/>
-            </a:endParaRPr>
-          </a:p>
-          <a:p>
+              <a:latin typeface="Arial"/>
+            </a:endParaRPr>
+          </a:p>
+          <a:p>
+            <a:pPr>
+              <a:lnSpc>
+                <a:spcPct val="100000"/>
+              </a:lnSpc>
+            </a:pPr>
             <a:endParaRPr b="0" lang="en-US" sz="1600" spc="-1" strike="noStrike">
-              <a:latin typeface="Bitstream Vera Sans"/>
-            </a:endParaRPr>
-          </a:p>
-          <a:p>
+              <a:latin typeface="Arial"/>
+            </a:endParaRPr>
+          </a:p>
+          <a:p>
+            <a:pPr>
+              <a:lnSpc>
+                <a:spcPct val="100000"/>
+              </a:lnSpc>
+            </a:pPr>
             <a:r>
               <a:rPr b="0" lang="en-US" sz="1600" spc="-1" strike="noStrike">
                 <a:solidFill>
@@ -3752,15 +3855,25 @@
               <a:t>What is the trend seen from the data over the years?</a:t>
             </a:r>
             <a:endParaRPr b="0" lang="en-US" sz="1600" spc="-1" strike="noStrike">
-              <a:latin typeface="Bitstream Vera Sans"/>
-            </a:endParaRPr>
-          </a:p>
-          <a:p>
+              <a:latin typeface="Arial"/>
+            </a:endParaRPr>
+          </a:p>
+          <a:p>
+            <a:pPr>
+              <a:lnSpc>
+                <a:spcPct val="100000"/>
+              </a:lnSpc>
+            </a:pPr>
             <a:endParaRPr b="0" lang="en-US" sz="1600" spc="-1" strike="noStrike">
-              <a:latin typeface="Bitstream Vera Sans"/>
-            </a:endParaRPr>
-          </a:p>
-          <a:p>
+              <a:latin typeface="Arial"/>
+            </a:endParaRPr>
+          </a:p>
+          <a:p>
+            <a:pPr>
+              <a:lnSpc>
+                <a:spcPct val="100000"/>
+              </a:lnSpc>
+            </a:pPr>
             <a:r>
               <a:rPr b="0" lang="en-US" sz="1600" spc="-1" strike="noStrike">
                 <a:solidFill>
@@ -3772,10 +3885,15 @@
               <a:t>What is the most common grade (mode, mean)?</a:t>
             </a:r>
             <a:endParaRPr b="0" lang="en-US" sz="1600" spc="-1" strike="noStrike">
-              <a:latin typeface="Bitstream Vera Sans"/>
-            </a:endParaRPr>
-          </a:p>
-          <a:p>
+              <a:latin typeface="Arial"/>
+            </a:endParaRPr>
+          </a:p>
+          <a:p>
+            <a:pPr>
+              <a:lnSpc>
+                <a:spcPct val="100000"/>
+              </a:lnSpc>
+            </a:pPr>
             <a:r>
               <a:rPr b="0" lang="en-US" sz="1600" spc="-1" strike="noStrike">
                 <a:solidFill>
@@ -3787,21 +3905,21 @@
               <a:t> </a:t>
             </a:r>
             <a:endParaRPr b="0" lang="en-US" sz="1600" spc="-1" strike="noStrike">
-              <a:latin typeface="Bitstream Vera Sans"/>
-            </a:endParaRPr>
-          </a:p>
-        </p:txBody>
-      </p:sp>
-      <p:sp>
-        <p:nvSpPr>
-          <p:cNvPr id="84" name="TextShape 5"/>
-          <p:cNvSpPr txBox="1"/>
+              <a:latin typeface="Arial"/>
+            </a:endParaRPr>
+          </a:p>
+        </p:txBody>
+      </p:sp>
+      <p:sp>
+        <p:nvSpPr>
+          <p:cNvPr id="84" name="CustomShape 5"/>
+          <p:cNvSpPr/>
           <p:nvPr/>
         </p:nvSpPr>
         <p:spPr>
           <a:xfrm>
             <a:off x="457200" y="5029200"/>
-            <a:ext cx="6858000" cy="268920"/>
+            <a:ext cx="6857640" cy="268560"/>
           </a:xfrm>
           <a:prstGeom prst="rect">
             <a:avLst/>
@@ -3811,11 +3929,22 @@
             <a:noFill/>
           </a:ln>
         </p:spPr>
+        <p:style>
+          <a:lnRef idx="0"/>
+          <a:fillRef idx="0"/>
+          <a:effectRef idx="0"/>
+          <a:fontRef idx="minor"/>
+        </p:style>
         <p:txBody>
           <a:bodyPr lIns="90000" rIns="90000" tIns="45000" bIns="45000">
             <a:noAutofit/>
           </a:bodyPr>
           <a:p>
+            <a:pPr>
+              <a:lnSpc>
+                <a:spcPct val="100000"/>
+              </a:lnSpc>
+            </a:pPr>
             <a:r>
               <a:rPr b="0" lang="en-US" sz="1200" spc="-1" strike="noStrike">
                 <a:latin typeface="Bitstream Vera Sans"/>
@@ -3823,14 +3952,18 @@
               <a:t>NB: For the full report visit </a:t>
             </a:r>
             <a:r>
-              <a:rPr b="0" lang="en-US" sz="1200" spc="-1" strike="noStrike">
+              <a:rPr b="0" lang="en-US" sz="1200" spc="-1" strike="noStrike" u="sng">
+                <a:solidFill>
+                  <a:srgbClr val="0000ff"/>
+                </a:solidFill>
+                <a:uFillTx/>
                 <a:latin typeface="Bitstream Vera Sans"/>
                 <a:hlinkClick r:id="rId1"/>
               </a:rPr>
               <a:t>https://github.com/MugoBrian/Kcse-Data-Analysis</a:t>
             </a:r>
             <a:endParaRPr b="0" lang="en-US" sz="1200" spc="-1" strike="noStrike">
-              <a:latin typeface="Bitstream Vera Sans"/>
+              <a:latin typeface="Arial"/>
             </a:endParaRPr>
           </a:p>
         </p:txBody>
@@ -3874,7 +4007,7 @@
         <p:spPr>
           <a:xfrm>
             <a:off x="228600" y="228600"/>
-            <a:ext cx="2057400" cy="688680"/>
+            <a:ext cx="2057040" cy="688320"/>
           </a:xfrm>
           <a:prstGeom prst="rect">
             <a:avLst/>
@@ -3925,7 +4058,7 @@
         <p:spPr>
           <a:xfrm>
             <a:off x="504000" y="1326600"/>
-            <a:ext cx="9070920" cy="3287520"/>
+            <a:ext cx="9070560" cy="3287160"/>
           </a:xfrm>
           <a:prstGeom prst="rect">
             <a:avLst/>
@@ -3944,14 +4077,14 @@
       </p:sp>
       <p:sp>
         <p:nvSpPr>
-          <p:cNvPr id="87" name="TextShape 3"/>
-          <p:cNvSpPr txBox="1"/>
+          <p:cNvPr id="87" name="CustomShape 3"/>
+          <p:cNvSpPr/>
           <p:nvPr/>
         </p:nvSpPr>
         <p:spPr>
           <a:xfrm>
             <a:off x="450360" y="862200"/>
-            <a:ext cx="8007840" cy="280800"/>
+            <a:ext cx="8007480" cy="280440"/>
           </a:xfrm>
           <a:prstGeom prst="rect">
             <a:avLst/>
@@ -3961,6 +4094,12 @@
             <a:noFill/>
           </a:ln>
         </p:spPr>
+        <p:style>
+          <a:lnRef idx="0"/>
+          <a:fillRef idx="0"/>
+          <a:effectRef idx="0"/>
+          <a:fontRef idx="minor"/>
+        </p:style>
         <p:txBody>
           <a:bodyPr lIns="90000" rIns="90000" tIns="45000" bIns="45000">
             <a:noAutofit/>
@@ -3992,14 +4131,14 @@
       </p:sp>
       <p:sp>
         <p:nvSpPr>
-          <p:cNvPr id="88" name="TextShape 4"/>
-          <p:cNvSpPr txBox="1"/>
+          <p:cNvPr id="88" name="CustomShape 4"/>
+          <p:cNvSpPr/>
           <p:nvPr/>
         </p:nvSpPr>
         <p:spPr>
           <a:xfrm>
             <a:off x="425880" y="1267560"/>
-            <a:ext cx="8282160" cy="661680"/>
+            <a:ext cx="8281800" cy="661320"/>
           </a:xfrm>
           <a:prstGeom prst="rect">
             <a:avLst/>
@@ -4009,11 +4148,22 @@
             <a:noFill/>
           </a:ln>
         </p:spPr>
+        <p:style>
+          <a:lnRef idx="0"/>
+          <a:fillRef idx="0"/>
+          <a:effectRef idx="0"/>
+          <a:fontRef idx="minor"/>
+        </p:style>
         <p:txBody>
           <a:bodyPr lIns="90000" rIns="90000" tIns="45000" bIns="45000">
             <a:noAutofit/>
           </a:bodyPr>
           <a:p>
+            <a:pPr>
+              <a:lnSpc>
+                <a:spcPct val="100000"/>
+              </a:lnSpc>
+            </a:pPr>
             <a:r>
               <a:rPr b="0" lang="en-US" sz="1300" spc="-1" strike="noStrike">
                 <a:latin typeface="Bitstream Vera Sans"/>
@@ -4025,11 +4175,21 @@
             </a:endParaRPr>
           </a:p>
           <a:p>
+            <a:pPr>
+              <a:lnSpc>
+                <a:spcPct val="100000"/>
+              </a:lnSpc>
+            </a:pPr>
             <a:endParaRPr b="0" lang="en-US" sz="1300" spc="-1" strike="noStrike">
               <a:latin typeface="Arial"/>
             </a:endParaRPr>
           </a:p>
           <a:p>
+            <a:pPr>
+              <a:lnSpc>
+                <a:spcPct val="100000"/>
+              </a:lnSpc>
+            </a:pPr>
             <a:r>
               <a:rPr b="0" lang="en-US" sz="1300" spc="-1" strike="noStrike">
                 <a:latin typeface="Bitstream Vera Sans"/>
@@ -4045,14 +4205,14 @@
       </p:sp>
       <p:sp>
         <p:nvSpPr>
-          <p:cNvPr id="89" name="TextShape 5"/>
-          <p:cNvSpPr txBox="1"/>
+          <p:cNvPr id="89" name="CustomShape 5"/>
+          <p:cNvSpPr/>
           <p:nvPr/>
         </p:nvSpPr>
         <p:spPr>
           <a:xfrm>
             <a:off x="425880" y="1929240"/>
-            <a:ext cx="9403920" cy="1042560"/>
+            <a:ext cx="9403560" cy="1042200"/>
           </a:xfrm>
           <a:prstGeom prst="rect">
             <a:avLst/>
@@ -4062,11 +4222,22 @@
             <a:noFill/>
           </a:ln>
         </p:spPr>
+        <p:style>
+          <a:lnRef idx="0"/>
+          <a:fillRef idx="0"/>
+          <a:effectRef idx="0"/>
+          <a:fontRef idx="minor"/>
+        </p:style>
         <p:txBody>
           <a:bodyPr lIns="90000" rIns="90000" tIns="45000" bIns="45000">
             <a:noAutofit/>
           </a:bodyPr>
           <a:p>
+            <a:pPr>
+              <a:lnSpc>
+                <a:spcPct val="100000"/>
+              </a:lnSpc>
+            </a:pPr>
             <a:r>
               <a:rPr b="0" lang="en-US" sz="1300" spc="-1" strike="noStrike">
                 <a:latin typeface="Bitstream Vera Sans"/>
@@ -4078,6 +4249,11 @@
             </a:endParaRPr>
           </a:p>
           <a:p>
+            <a:pPr>
+              <a:lnSpc>
+                <a:spcPct val="100000"/>
+              </a:lnSpc>
+            </a:pPr>
             <a:r>
               <a:rPr b="0" lang="en-US" sz="1300" spc="-1" strike="noStrike">
                 <a:latin typeface="Bitstream Vera Sans"/>
@@ -4089,6 +4265,11 @@
             </a:endParaRPr>
           </a:p>
           <a:p>
+            <a:pPr>
+              <a:lnSpc>
+                <a:spcPct val="100000"/>
+              </a:lnSpc>
+            </a:pPr>
             <a:r>
               <a:rPr b="0" lang="en-US" sz="1300" spc="-1" strike="noStrike">
                 <a:latin typeface="Bitstream Vera Sans"/>
@@ -4100,11 +4281,21 @@
             </a:endParaRPr>
           </a:p>
           <a:p>
+            <a:pPr>
+              <a:lnSpc>
+                <a:spcPct val="100000"/>
+              </a:lnSpc>
+            </a:pPr>
             <a:endParaRPr b="0" lang="en-US" sz="1300" spc="-1" strike="noStrike">
               <a:latin typeface="Arial"/>
             </a:endParaRPr>
           </a:p>
           <a:p>
+            <a:pPr>
+              <a:lnSpc>
+                <a:spcPct val="100000"/>
+              </a:lnSpc>
+            </a:pPr>
             <a:r>
               <a:rPr b="0" lang="en-US" sz="1300" spc="-1" strike="noStrike">
                 <a:latin typeface="Bitstream Vera Sans"/>
@@ -4129,31 +4320,8 @@
         </p:blipFill>
         <p:spPr>
           <a:xfrm>
-            <a:off x="457200" y="3200400"/>
-            <a:ext cx="5257800" cy="2286000"/>
-          </a:xfrm>
-          <a:prstGeom prst="rect">
-            <a:avLst/>
-          </a:prstGeom>
-          <a:ln w="0">
-            <a:noFill/>
-          </a:ln>
-        </p:spPr>
-      </p:pic>
-      <p:pic>
-        <p:nvPicPr>
-          <p:cNvPr id="91" name="" descr=""/>
-          <p:cNvPicPr/>
-          <p:nvPr/>
-        </p:nvPicPr>
-        <p:blipFill>
-          <a:blip r:embed="rId2"/>
-          <a:stretch/>
-        </p:blipFill>
-        <p:spPr>
-          <a:xfrm>
-            <a:off x="5943600" y="2971800"/>
-            <a:ext cx="3683880" cy="2654640"/>
+            <a:off x="1143000" y="2971800"/>
+            <a:ext cx="7416720" cy="2332080"/>
           </a:xfrm>
           <a:prstGeom prst="rect">
             <a:avLst/>
@@ -4195,14 +4363,14 @@
       </p:grpSpPr>
       <p:sp>
         <p:nvSpPr>
-          <p:cNvPr id="92" name="CustomShape 1"/>
+          <p:cNvPr id="91" name="CustomShape 1"/>
           <p:cNvSpPr/>
           <p:nvPr/>
         </p:nvSpPr>
         <p:spPr>
           <a:xfrm>
             <a:off x="450360" y="196920"/>
-            <a:ext cx="9070920" cy="946080"/>
+            <a:ext cx="9070560" cy="945720"/>
           </a:xfrm>
           <a:prstGeom prst="rect">
             <a:avLst/>
@@ -4244,6 +4412,29 @@
           </a:p>
         </p:txBody>
       </p:sp>
+      <p:pic>
+        <p:nvPicPr>
+          <p:cNvPr id="92" name="" descr=""/>
+          <p:cNvPicPr/>
+          <p:nvPr/>
+        </p:nvPicPr>
+        <p:blipFill>
+          <a:blip r:embed="rId1"/>
+          <a:stretch/>
+        </p:blipFill>
+        <p:spPr>
+          <a:xfrm>
+            <a:off x="7172640" y="2541960"/>
+            <a:ext cx="2657160" cy="2445120"/>
+          </a:xfrm>
+          <a:prstGeom prst="rect">
+            <a:avLst/>
+          </a:prstGeom>
+          <a:ln w="18000">
+            <a:noFill/>
+          </a:ln>
+        </p:spPr>
+      </p:pic>
       <p:sp>
         <p:nvSpPr>
           <p:cNvPr id="93" name="CustomShape 2"/>
@@ -4251,9 +4442,9 @@
           <p:nvPr/>
         </p:nvSpPr>
         <p:spPr>
-          <a:xfrm rot="6000">
-            <a:off x="453600" y="914400"/>
-            <a:ext cx="9143640" cy="4209840"/>
+          <a:xfrm>
+            <a:off x="425880" y="5217840"/>
+            <a:ext cx="6857640" cy="268560"/>
           </a:xfrm>
           <a:prstGeom prst="rect">
             <a:avLst/>
@@ -4270,225 +4461,34 @@
           <a:fontRef idx="minor"/>
         </p:style>
         <p:txBody>
-          <a:bodyPr lIns="0" rIns="0" tIns="0" bIns="0">
-            <a:normAutofit/>
-          </a:bodyPr>
-          <a:p>
-            <a:pPr marL="432000" indent="-323280">
-              <a:lnSpc>
-                <a:spcPct val="100000"/>
-              </a:lnSpc>
-              <a:spcBef>
-                <a:spcPts val="777"/>
-              </a:spcBef>
-              <a:buClr>
-                <a:srgbClr val="000000"/>
-              </a:buClr>
-              <a:buSzPct val="45000"/>
-              <a:buFont typeface="Wingdings" charset="2"/>
-              <a:buChar char=""/>
-            </a:pPr>
-            <a:endParaRPr b="0" lang="en-US" sz="1800" spc="-1" strike="noStrike">
-              <a:latin typeface="Arial"/>
-              <a:ea typeface="Bitstream Vera Sans"/>
-            </a:endParaRPr>
-          </a:p>
-          <a:p>
-            <a:pPr marL="432000" indent="-323280">
-              <a:lnSpc>
-                <a:spcPct val="100000"/>
-              </a:lnSpc>
-              <a:spcBef>
-                <a:spcPts val="777"/>
-              </a:spcBef>
-              <a:buClr>
-                <a:srgbClr val="000000"/>
-              </a:buClr>
-              <a:buSzPct val="45000"/>
-              <a:buFont typeface="Wingdings" charset="2"/>
-              <a:buChar char=""/>
-            </a:pPr>
-            <a:r>
-              <a:rPr b="0" lang="en-US" sz="1300" spc="-1" strike="noStrike">
-                <a:solidFill>
-                  <a:srgbClr val="000000"/>
-                </a:solidFill>
-                <a:latin typeface="Bitstream Vera Sans"/>
-                <a:ea typeface="DejaVu Sans"/>
-              </a:rPr>
-              <a:t>In 2016:</a:t>
-            </a:r>
-            <a:endParaRPr b="0" lang="en-US" sz="1300" spc="-1" strike="noStrike">
-              <a:latin typeface="Arial"/>
-              <a:ea typeface="Bitstream Vera Sans"/>
-            </a:endParaRPr>
-          </a:p>
-          <a:p>
-            <a:pPr marL="432000" indent="-323280">
-              <a:lnSpc>
-                <a:spcPct val="100000"/>
-              </a:lnSpc>
-              <a:buClr>
-                <a:srgbClr val="000000"/>
-              </a:buClr>
-              <a:buSzPct val="45000"/>
-              <a:buFont typeface="Wingdings" charset="2"/>
-              <a:buChar char=""/>
-            </a:pPr>
-            <a:r>
-              <a:rPr b="0" lang="en-US" sz="1300" spc="-1" strike="noStrike">
-                <a:solidFill>
-                  <a:srgbClr val="000000"/>
-                </a:solidFill>
-                <a:latin typeface="Bitstream Vera Sans"/>
-                <a:ea typeface="DejaVu Sans"/>
-              </a:rPr>
-              <a:t>Total number of quality grades in female candidates is higher than that of male candidates. Total number of non quality grades in female candidates is higher than that of male candidates.</a:t>
-            </a:r>
-            <a:endParaRPr b="0" lang="en-US" sz="1300" spc="-1" strike="noStrike">
-              <a:latin typeface="Arial"/>
-              <a:ea typeface="Bitstream Vera Sans"/>
-            </a:endParaRPr>
-          </a:p>
-          <a:p>
-            <a:pPr marL="432000" indent="-323280">
-              <a:lnSpc>
-                <a:spcPct val="100000"/>
-              </a:lnSpc>
-              <a:buClr>
-                <a:srgbClr val="000000"/>
-              </a:buClr>
-              <a:buSzPct val="45000"/>
-              <a:buFont typeface="Wingdings" charset="2"/>
-              <a:buChar char=""/>
-            </a:pPr>
-            <a:r>
-              <a:rPr b="0" lang="en-US" sz="1300" spc="-1" strike="noStrike">
-                <a:solidFill>
-                  <a:srgbClr val="000000"/>
-                </a:solidFill>
-                <a:latin typeface="Bitstream Vera Sans"/>
-                <a:ea typeface="DejaVu Sans"/>
-              </a:rPr>
-              <a:t>Total number of female candidates is higher than male candidates</a:t>
-            </a:r>
-            <a:r>
-              <a:rPr b="0" lang="en-US" sz="2400" spc="-1" strike="noStrike">
-                <a:solidFill>
-                  <a:srgbClr val="000000"/>
-                </a:solidFill>
-                <a:latin typeface="Bitstream Vera Sans"/>
-                <a:ea typeface="DejaVu Sans"/>
-              </a:rPr>
-              <a:t>.</a:t>
-            </a:r>
-            <a:endParaRPr b="0" lang="en-US" sz="2400" spc="-1" strike="noStrike">
-              <a:latin typeface="Arial"/>
-              <a:ea typeface="Bitstream Vera Sans"/>
-            </a:endParaRPr>
-          </a:p>
-          <a:p>
-            <a:pPr marL="432000" indent="-323280">
-              <a:lnSpc>
-                <a:spcPct val="100000"/>
-              </a:lnSpc>
-              <a:spcBef>
-                <a:spcPts val="1060"/>
-              </a:spcBef>
-              <a:buClr>
-                <a:srgbClr val="000000"/>
-              </a:buClr>
-              <a:buSzPct val="45000"/>
-              <a:buFont typeface="Wingdings" charset="2"/>
-              <a:buChar char=""/>
-            </a:pPr>
-            <a:endParaRPr b="0" lang="en-US" sz="2400" spc="-1" strike="noStrike">
-              <a:latin typeface="Arial"/>
-              <a:ea typeface="Bitstream Vera Sans"/>
-            </a:endParaRPr>
-          </a:p>
+          <a:bodyPr lIns="90000" rIns="90000" tIns="45000" bIns="45000">
+            <a:noAutofit/>
+          </a:bodyPr>
           <a:p>
             <a:pPr>
               <a:lnSpc>
                 <a:spcPct val="100000"/>
               </a:lnSpc>
-              <a:spcBef>
-                <a:spcPts val="1060"/>
-              </a:spcBef>
-            </a:pPr>
-            <a:endParaRPr b="0" lang="en-US" sz="2400" spc="-1" strike="noStrike">
-              <a:latin typeface="Arial"/>
-              <a:ea typeface="Bitstream Vera Sans"/>
-            </a:endParaRPr>
-          </a:p>
-          <a:p>
-            <a:pPr marL="432000" indent="-323280">
-              <a:lnSpc>
-                <a:spcPct val="100000"/>
-              </a:lnSpc>
-              <a:spcBef>
-                <a:spcPts val="1060"/>
-              </a:spcBef>
-              <a:buClr>
-                <a:srgbClr val="000000"/>
-              </a:buClr>
-              <a:buSzPct val="45000"/>
-              <a:buFont typeface="Wingdings" charset="2"/>
-              <a:buChar char=""/>
-            </a:pPr>
-            <a:endParaRPr b="0" lang="en-US" sz="2400" spc="-1" strike="noStrike">
-              <a:latin typeface="Arial"/>
-              <a:ea typeface="Bitstream Vera Sans"/>
-            </a:endParaRPr>
-          </a:p>
-          <a:p>
-            <a:pPr marL="432000" indent="-323280">
-              <a:lnSpc>
-                <a:spcPct val="100000"/>
-              </a:lnSpc>
-              <a:spcBef>
-                <a:spcPts val="1060"/>
-              </a:spcBef>
-              <a:buClr>
-                <a:srgbClr val="000000"/>
-              </a:buClr>
-              <a:buSzPct val="45000"/>
-              <a:buFont typeface="Wingdings" charset="2"/>
-              <a:buChar char=""/>
-            </a:pPr>
-            <a:endParaRPr b="0" lang="en-US" sz="2400" spc="-1" strike="noStrike">
-              <a:latin typeface="Arial"/>
-              <a:ea typeface="Bitstream Vera Sans"/>
-            </a:endParaRPr>
-          </a:p>
-          <a:p>
-            <a:pPr marL="432000" indent="-323280">
-              <a:lnSpc>
-                <a:spcPct val="100000"/>
-              </a:lnSpc>
-              <a:spcBef>
-                <a:spcPts val="1060"/>
-              </a:spcBef>
-              <a:buClr>
-                <a:srgbClr val="000000"/>
-              </a:buClr>
-              <a:buSzPct val="45000"/>
-              <a:buFont typeface="Wingdings" charset="2"/>
-              <a:buChar char=""/>
-            </a:pPr>
-            <a:r>
-              <a:rPr b="0" lang="en-US" sz="2400" spc="-1" strike="noStrike">
+            </a:pPr>
+            <a:r>
+              <a:rPr b="0" lang="en-US" sz="1200" spc="-1" strike="noStrike">
+                <a:latin typeface="Bitstream Vera Sans"/>
+              </a:rPr>
+              <a:t>NB: For the full report visit </a:t>
+            </a:r>
+            <a:r>
+              <a:rPr b="0" lang="en-US" sz="1200" spc="-1" strike="noStrike" u="sng">
                 <a:solidFill>
-                  <a:srgbClr val="000000"/>
+                  <a:srgbClr val="0000ff"/>
                 </a:solidFill>
+                <a:uFillTx/>
                 <a:latin typeface="Bitstream Vera Sans"/>
-                <a:ea typeface="DejaVu Sans"/>
-              </a:rPr>
-              <a:t> </a:t>
-            </a:r>
-            <a:endParaRPr b="0" lang="en-US" sz="2400" spc="-1" strike="noStrike">
-              <a:latin typeface="Arial"/>
-              <a:ea typeface="Bitstream Vera Sans"/>
+                <a:hlinkClick r:id="rId2"/>
+              </a:rPr>
+              <a:t>https://github.com/MugoBrian/Kcse-Data-Analysis</a:t>
+            </a:r>
+            <a:endParaRPr b="0" lang="en-US" sz="1200" spc="-1" strike="noStrike">
+              <a:latin typeface="Arial"/>
             </a:endParaRPr>
           </a:p>
         </p:txBody>
@@ -4500,36 +4500,13 @@
           <p:nvPr/>
         </p:nvPicPr>
         <p:blipFill>
-          <a:blip r:embed="rId1"/>
+          <a:blip r:embed="rId3"/>
           <a:stretch/>
         </p:blipFill>
         <p:spPr>
           <a:xfrm>
-            <a:off x="7086960" y="2126520"/>
-            <a:ext cx="2742840" cy="2445480"/>
-          </a:xfrm>
-          <a:prstGeom prst="rect">
-            <a:avLst/>
-          </a:prstGeom>
-          <a:ln w="18000">
-            <a:noFill/>
-          </a:ln>
-        </p:spPr>
-      </p:pic>
-      <p:pic>
-        <p:nvPicPr>
-          <p:cNvPr id="95" name="" descr=""/>
-          <p:cNvPicPr/>
-          <p:nvPr/>
-        </p:nvPicPr>
-        <p:blipFill>
-          <a:blip r:embed="rId2"/>
-          <a:stretch/>
-        </p:blipFill>
-        <p:spPr>
-          <a:xfrm>
-            <a:off x="450360" y="2183040"/>
-            <a:ext cx="7044840" cy="2846160"/>
+            <a:off x="370440" y="2743200"/>
+            <a:ext cx="7282440" cy="2514600"/>
           </a:xfrm>
           <a:prstGeom prst="rect">
             <a:avLst/>
@@ -4541,14 +4518,14 @@
       </p:pic>
       <p:sp>
         <p:nvSpPr>
-          <p:cNvPr id="96" name="TextShape 3"/>
+          <p:cNvPr id="95" name="TextShape 3"/>
           <p:cNvSpPr txBox="1"/>
           <p:nvPr/>
         </p:nvSpPr>
         <p:spPr>
           <a:xfrm>
-            <a:off x="425880" y="5217840"/>
-            <a:ext cx="6858000" cy="268920"/>
+            <a:off x="457200" y="914400"/>
+            <a:ext cx="9372600" cy="1016640"/>
           </a:xfrm>
           <a:prstGeom prst="rect">
             <a:avLst/>
@@ -4563,21 +4540,151 @@
             <a:noAutofit/>
           </a:bodyPr>
           <a:p>
-            <a:r>
-              <a:rPr b="0" lang="en-US" sz="1200" spc="-1" strike="noStrike">
+            <a:pPr>
+              <a:lnSpc>
+                <a:spcPct val="100000"/>
+              </a:lnSpc>
+              <a:spcBef>
+                <a:spcPts val="777"/>
+              </a:spcBef>
+            </a:pPr>
+            <a:r>
+              <a:rPr b="0" lang="en-US" sz="1300" spc="-1" strike="noStrike">
+                <a:solidFill>
+                  <a:srgbClr val="000000"/>
+                </a:solidFill>
                 <a:latin typeface="Bitstream Vera Sans"/>
-              </a:rPr>
-              <a:t>NB: For the full report visit </a:t>
-            </a:r>
-            <a:r>
-              <a:rPr b="0" lang="en-US" sz="1200" spc="-1" strike="noStrike">
+                <a:ea typeface="DejaVu Sans"/>
+              </a:rPr>
+              <a:t>In 2016:</a:t>
+            </a:r>
+            <a:endParaRPr b="0" lang="en-US" sz="1300" spc="-1" strike="noStrike">
+              <a:latin typeface="Arial"/>
+            </a:endParaRPr>
+          </a:p>
+          <a:p>
+            <a:pPr>
+              <a:lnSpc>
+                <a:spcPct val="100000"/>
+              </a:lnSpc>
+            </a:pPr>
+            <a:r>
+              <a:rPr b="0" lang="en-US" sz="1300" spc="-1" strike="noStrike">
+                <a:solidFill>
+                  <a:srgbClr val="000000"/>
+                </a:solidFill>
                 <a:latin typeface="Bitstream Vera Sans"/>
-                <a:hlinkClick r:id="rId3"/>
-              </a:rPr>
-              <a:t>https://github.com/MugoBrian/Kcse-Data-Analysis</a:t>
-            </a:r>
-            <a:endParaRPr b="0" lang="en-US" sz="1200" spc="-1" strike="noStrike">
-              <a:latin typeface="Bitstream Vera Sans"/>
+                <a:ea typeface="DejaVu Sans"/>
+              </a:rPr>
+              <a:t>Total number of quality grades in female candidates is higher than that of male candidates. Total number of non quality grades in female candidates is higher than that of male candidates.</a:t>
+            </a:r>
+            <a:endParaRPr b="0" lang="en-US" sz="1300" spc="-1" strike="noStrike">
+              <a:latin typeface="Arial"/>
+            </a:endParaRPr>
+          </a:p>
+          <a:p>
+            <a:pPr>
+              <a:lnSpc>
+                <a:spcPct val="100000"/>
+              </a:lnSpc>
+            </a:pPr>
+            <a:r>
+              <a:rPr b="0" lang="en-US" sz="1300" spc="-1" strike="noStrike">
+                <a:solidFill>
+                  <a:srgbClr val="000000"/>
+                </a:solidFill>
+                <a:latin typeface="Bitstream Vera Sans"/>
+                <a:ea typeface="DejaVu Sans"/>
+              </a:rPr>
+              <a:t>Total number of female candidates is higher than male candidates</a:t>
+            </a:r>
+            <a:r>
+              <a:rPr b="0" lang="en-US" sz="2400" spc="-1" strike="noStrike">
+                <a:solidFill>
+                  <a:srgbClr val="000000"/>
+                </a:solidFill>
+                <a:latin typeface="Bitstream Vera Sans"/>
+                <a:ea typeface="DejaVu Sans"/>
+              </a:rPr>
+              <a:t>.</a:t>
+            </a:r>
+            <a:endParaRPr b="0" lang="en-US" sz="2400" spc="-1" strike="noStrike">
+              <a:latin typeface="Arial"/>
+            </a:endParaRPr>
+          </a:p>
+        </p:txBody>
+      </p:sp>
+      <p:sp>
+        <p:nvSpPr>
+          <p:cNvPr id="96" name="TextShape 4"/>
+          <p:cNvSpPr txBox="1"/>
+          <p:nvPr/>
+        </p:nvSpPr>
+        <p:spPr>
+          <a:xfrm>
+            <a:off x="457200" y="1798200"/>
+            <a:ext cx="9257760" cy="917640"/>
+          </a:xfrm>
+          <a:prstGeom prst="rect">
+            <a:avLst/>
+          </a:prstGeom>
+          <a:noFill/>
+          <a:ln w="0">
+            <a:noFill/>
+          </a:ln>
+        </p:spPr>
+        <p:txBody>
+          <a:bodyPr lIns="90000" rIns="90000" tIns="45000" bIns="45000">
+            <a:noAutofit/>
+          </a:bodyPr>
+          <a:p>
+            <a:r>
+              <a:rPr b="0" lang="en-US" sz="1800" spc="-1" strike="noStrike">
+                <a:latin typeface="Arial"/>
+              </a:rPr>
+              <a:t>I</a:t>
+            </a:r>
+            <a:r>
+              <a:rPr b="0" lang="en-US" sz="1300" spc="-1" strike="noStrike">
+                <a:latin typeface="Bitstream Vera Sans"/>
+              </a:rPr>
+              <a:t>n 2011:</a:t>
+            </a:r>
+            <a:endParaRPr b="0" lang="en-US" sz="1300" spc="-1" strike="noStrike">
+              <a:latin typeface="Arial"/>
+            </a:endParaRPr>
+          </a:p>
+          <a:p>
+            <a:r>
+              <a:rPr b="0" lang="en-US" sz="1300" spc="-1" strike="noStrike">
+                <a:latin typeface="Bitstream Vera Sans"/>
+              </a:rPr>
+              <a:t>1. There's a sharp increase in  the total number of candidates</a:t>
+            </a:r>
+            <a:endParaRPr b="0" lang="en-US" sz="1300" spc="-1" strike="noStrike">
+              <a:latin typeface="Arial"/>
+            </a:endParaRPr>
+          </a:p>
+          <a:p>
+            <a:r>
+              <a:rPr b="0" lang="en-US" sz="1300" spc="-1" strike="noStrike">
+                <a:latin typeface="Bitstream Vera Sans"/>
+              </a:rPr>
+              <a:t>2. There's a sharp increase in the total number of candidates who scored grade B+</a:t>
+            </a:r>
+            <a:endParaRPr b="0" lang="en-US" sz="1300" spc="-1" strike="noStrike">
+              <a:latin typeface="Arial"/>
+            </a:endParaRPr>
+          </a:p>
+          <a:p>
+            <a:r>
+              <a:rPr b="0" lang="en-US" sz="1300" spc="-1" strike="noStrike">
+                <a:latin typeface="Bitstream Vera Sans"/>
+              </a:rPr>
+              <a:t>3. There's a huge gap difference between the total number of male and female candidates</a:t>
+            </a:r>
+            <a:endParaRPr b="0" lang="en-US" sz="1300" spc="-1" strike="noStrike">
+              <a:latin typeface="Arial"/>
             </a:endParaRPr>
           </a:p>
         </p:txBody>
@@ -4621,7 +4728,7 @@
         <p:spPr>
           <a:xfrm>
             <a:off x="300960" y="196200"/>
-            <a:ext cx="9070920" cy="946080"/>
+            <a:ext cx="9070560" cy="945720"/>
           </a:xfrm>
           <a:prstGeom prst="rect">
             <a:avLst/>
@@ -4672,7 +4779,7 @@
         <p:spPr>
           <a:xfrm>
             <a:off x="504000" y="1055160"/>
-            <a:ext cx="9070920" cy="3287520"/>
+            <a:ext cx="9070560" cy="3287160"/>
           </a:xfrm>
           <a:prstGeom prst="rect">
             <a:avLst/>
@@ -4706,7 +4813,7 @@
             </a:endParaRPr>
           </a:p>
           <a:p>
-            <a:pPr marL="432000" indent="-323280">
+            <a:pPr marL="432000" indent="-322920">
               <a:lnSpc>
                 <a:spcPct val="100000"/>
               </a:lnSpc>
@@ -4748,7 +4855,7 @@
             </a:endParaRPr>
           </a:p>
           <a:p>
-            <a:pPr marL="432000" indent="-323280">
+            <a:pPr marL="432000" indent="-322920">
               <a:lnSpc>
                 <a:spcPct val="100000"/>
               </a:lnSpc>
@@ -4790,7 +4897,7 @@
             </a:endParaRPr>
           </a:p>
           <a:p>
-            <a:pPr marL="432000" indent="-323280">
+            <a:pPr marL="432000" indent="-322920">
               <a:lnSpc>
                 <a:spcPct val="100000"/>
               </a:lnSpc>
@@ -4832,7 +4939,7 @@
             </a:endParaRPr>
           </a:p>
           <a:p>
-            <a:pPr marL="432000" indent="-323280">
+            <a:pPr marL="432000" indent="-322920">
               <a:lnSpc>
                 <a:spcPct val="100000"/>
               </a:lnSpc>
@@ -4874,7 +4981,7 @@
             </a:endParaRPr>
           </a:p>
           <a:p>
-            <a:pPr marL="432000" indent="-323280">
+            <a:pPr marL="432000" indent="-322920">
               <a:lnSpc>
                 <a:spcPct val="100000"/>
               </a:lnSpc>
@@ -4916,14 +5023,14 @@
       </p:sp>
       <p:sp>
         <p:nvSpPr>
-          <p:cNvPr id="99" name="TextShape 3"/>
-          <p:cNvSpPr txBox="1"/>
+          <p:cNvPr id="99" name="CustomShape 3"/>
+          <p:cNvSpPr/>
           <p:nvPr/>
         </p:nvSpPr>
         <p:spPr>
           <a:xfrm>
             <a:off x="457200" y="5217480"/>
-            <a:ext cx="6858000" cy="268920"/>
+            <a:ext cx="6857640" cy="268560"/>
           </a:xfrm>
           <a:prstGeom prst="rect">
             <a:avLst/>
@@ -4933,11 +5040,22 @@
             <a:noFill/>
           </a:ln>
         </p:spPr>
+        <p:style>
+          <a:lnRef idx="0"/>
+          <a:fillRef idx="0"/>
+          <a:effectRef idx="0"/>
+          <a:fontRef idx="minor"/>
+        </p:style>
         <p:txBody>
           <a:bodyPr lIns="90000" rIns="90000" tIns="45000" bIns="45000">
             <a:noAutofit/>
           </a:bodyPr>
           <a:p>
+            <a:pPr>
+              <a:lnSpc>
+                <a:spcPct val="100000"/>
+              </a:lnSpc>
+            </a:pPr>
             <a:r>
               <a:rPr b="0" lang="en-US" sz="1200" spc="-1" strike="noStrike">
                 <a:latin typeface="Bitstream Vera Sans"/>
@@ -4945,14 +5063,18 @@
               <a:t>NB: For the full report visit </a:t>
             </a:r>
             <a:r>
-              <a:rPr b="0" lang="en-US" sz="1200" spc="-1" strike="noStrike">
+              <a:rPr b="0" lang="en-US" sz="1200" spc="-1" strike="noStrike" u="sng">
+                <a:solidFill>
+                  <a:srgbClr val="0000ff"/>
+                </a:solidFill>
+                <a:uFillTx/>
                 <a:latin typeface="Bitstream Vera Sans"/>
                 <a:hlinkClick r:id="rId1"/>
               </a:rPr>
               <a:t>https://github.com/MugoBrian/Kcse-Data-Analysis</a:t>
             </a:r>
             <a:endParaRPr b="0" lang="en-US" sz="1200" spc="-1" strike="noStrike">
-              <a:latin typeface="Bitstream Vera Sans"/>
+              <a:latin typeface="Arial"/>
             </a:endParaRPr>
           </a:p>
         </p:txBody>

</xml_diff>